<commit_message>
added placeholder slides for payroll and made minor revisions
</commit_message>
<xml_diff>
--- a/Slides/Red Team Presentation.pptx
+++ b/Slides/Red Team Presentation.pptx
@@ -5,7 +5,7 @@
     <p:sldMasterId id="2147483690" r:id="rId1"/>
   </p:sldMasterIdLst>
   <p:handoutMasterIdLst>
-    <p:handoutMasterId r:id="rId29"/>
+    <p:handoutMasterId r:id="rId34"/>
   </p:handoutMasterIdLst>
   <p:sldIdLst>
     <p:sldId id="271" r:id="rId2"/>
@@ -23,18 +23,23 @@
     <p:sldId id="265" r:id="rId14"/>
     <p:sldId id="266" r:id="rId15"/>
     <p:sldId id="267" r:id="rId16"/>
-    <p:sldId id="274" r:id="rId17"/>
-    <p:sldId id="275" r:id="rId18"/>
-    <p:sldId id="258" r:id="rId19"/>
-    <p:sldId id="259" r:id="rId20"/>
-    <p:sldId id="276" r:id="rId21"/>
-    <p:sldId id="277" r:id="rId22"/>
-    <p:sldId id="278" r:id="rId23"/>
-    <p:sldId id="279" r:id="rId24"/>
-    <p:sldId id="280" r:id="rId25"/>
-    <p:sldId id="281" r:id="rId26"/>
-    <p:sldId id="282" r:id="rId27"/>
-    <p:sldId id="283" r:id="rId28"/>
+    <p:sldId id="285" r:id="rId17"/>
+    <p:sldId id="286" r:id="rId18"/>
+    <p:sldId id="287" r:id="rId19"/>
+    <p:sldId id="288" r:id="rId20"/>
+    <p:sldId id="274" r:id="rId21"/>
+    <p:sldId id="275" r:id="rId22"/>
+    <p:sldId id="258" r:id="rId23"/>
+    <p:sldId id="259" r:id="rId24"/>
+    <p:sldId id="276" r:id="rId25"/>
+    <p:sldId id="277" r:id="rId26"/>
+    <p:sldId id="278" r:id="rId27"/>
+    <p:sldId id="279" r:id="rId28"/>
+    <p:sldId id="280" r:id="rId29"/>
+    <p:sldId id="281" r:id="rId30"/>
+    <p:sldId id="282" r:id="rId31"/>
+    <p:sldId id="284" r:id="rId32"/>
+    <p:sldId id="283" r:id="rId33"/>
   </p:sldIdLst>
   <p:sldSz cx="12192000" cy="6858000"/>
   <p:notesSz cx="7010400" cy="9296400"/>
@@ -7592,6 +7597,467 @@
       </p:grpSpPr>
       <p:sp>
         <p:nvSpPr>
+          <p:cNvPr id="2" name="Title 1">
+            <a:extLst>
+              <a:ext uri="{FF2B5EF4-FFF2-40B4-BE49-F238E27FC236}">
+                <a16:creationId xmlns:a16="http://schemas.microsoft.com/office/drawing/2014/main" id="{3901C10C-1FA0-48B3-8DCA-3AE61719D42F}"/>
+              </a:ext>
+            </a:extLst>
+          </p:cNvPr>
+          <p:cNvSpPr>
+            <a:spLocks noGrp="1"/>
+          </p:cNvSpPr>
+          <p:nvPr>
+            <p:ph type="title"/>
+          </p:nvPr>
+        </p:nvSpPr>
+        <p:spPr/>
+        <p:txBody>
+          <a:bodyPr/>
+          <a:lstStyle/>
+          <a:p>
+            <a:r>
+              <a:rPr lang="en-US" dirty="0"/>
+              <a:t>Attendance vs Payroll</a:t>
+            </a:r>
+          </a:p>
+        </p:txBody>
+      </p:sp>
+      <p:sp>
+        <p:nvSpPr>
+          <p:cNvPr id="3" name="Content Placeholder 2">
+            <a:extLst>
+              <a:ext uri="{FF2B5EF4-FFF2-40B4-BE49-F238E27FC236}">
+                <a16:creationId xmlns:a16="http://schemas.microsoft.com/office/drawing/2014/main" id="{B055CD7A-BB38-4699-BB77-5B0A78CDAB33}"/>
+              </a:ext>
+            </a:extLst>
+          </p:cNvPr>
+          <p:cNvSpPr>
+            <a:spLocks noGrp="1"/>
+          </p:cNvSpPr>
+          <p:nvPr>
+            <p:ph idx="1"/>
+          </p:nvPr>
+        </p:nvSpPr>
+        <p:spPr/>
+        <p:txBody>
+          <a:bodyPr/>
+          <a:lstStyle/>
+          <a:p>
+            <a:r>
+              <a:rPr lang="en-US" dirty="0"/>
+              <a:t>What is the correlation between team salaries and ticket sales?</a:t>
+            </a:r>
+          </a:p>
+        </p:txBody>
+      </p:sp>
+    </p:spTree>
+    <p:extLst>
+      <p:ext uri="{BB962C8B-B14F-4D97-AF65-F5344CB8AC3E}">
+        <p14:creationId xmlns:p14="http://schemas.microsoft.com/office/powerpoint/2010/main" val="2407838399"/>
+      </p:ext>
+    </p:extLst>
+  </p:cSld>
+  <p:clrMapOvr>
+    <a:masterClrMapping/>
+  </p:clrMapOvr>
+</p:sld>
+</file>
+
+<file path=ppt/slides/slide17.xml><?xml version="1.0" encoding="utf-8"?>
+<p:sld xmlns:a="http://schemas.openxmlformats.org/drawingml/2006/main" xmlns:r="http://schemas.openxmlformats.org/officeDocument/2006/relationships" xmlns:p="http://schemas.openxmlformats.org/presentationml/2006/main">
+  <p:cSld>
+    <p:spTree>
+      <p:nvGrpSpPr>
+        <p:cNvPr id="1" name=""/>
+        <p:cNvGrpSpPr/>
+        <p:nvPr/>
+      </p:nvGrpSpPr>
+      <p:grpSpPr>
+        <a:xfrm>
+          <a:off x="0" y="0"/>
+          <a:ext cx="0" cy="0"/>
+          <a:chOff x="0" y="0"/>
+          <a:chExt cx="0" cy="0"/>
+        </a:xfrm>
+      </p:grpSpPr>
+      <p:sp>
+        <p:nvSpPr>
+          <p:cNvPr id="2" name="Title 1">
+            <a:extLst>
+              <a:ext uri="{FF2B5EF4-FFF2-40B4-BE49-F238E27FC236}">
+                <a16:creationId xmlns:a16="http://schemas.microsoft.com/office/drawing/2014/main" id="{AC5184F9-DEE3-47D7-B3AB-4F6E8D9DA043}"/>
+              </a:ext>
+            </a:extLst>
+          </p:cNvPr>
+          <p:cNvSpPr>
+            <a:spLocks noGrp="1"/>
+          </p:cNvSpPr>
+          <p:nvPr>
+            <p:ph type="title"/>
+          </p:nvPr>
+        </p:nvSpPr>
+        <p:spPr/>
+        <p:txBody>
+          <a:bodyPr/>
+          <a:lstStyle/>
+          <a:p>
+            <a:r>
+              <a:rPr lang="en-US" dirty="0"/>
+              <a:t>Considerations</a:t>
+            </a:r>
+          </a:p>
+        </p:txBody>
+      </p:sp>
+      <p:sp>
+        <p:nvSpPr>
+          <p:cNvPr id="3" name="Content Placeholder 2">
+            <a:extLst>
+              <a:ext uri="{FF2B5EF4-FFF2-40B4-BE49-F238E27FC236}">
+                <a16:creationId xmlns:a16="http://schemas.microsoft.com/office/drawing/2014/main" id="{040AC088-00A8-4178-8FAB-6F5D21661E64}"/>
+              </a:ext>
+            </a:extLst>
+          </p:cNvPr>
+          <p:cNvSpPr>
+            <a:spLocks noGrp="1"/>
+          </p:cNvSpPr>
+          <p:nvPr>
+            <p:ph idx="1"/>
+          </p:nvPr>
+        </p:nvSpPr>
+        <p:spPr/>
+        <p:txBody>
+          <a:bodyPr/>
+          <a:lstStyle/>
+          <a:p>
+            <a:r>
+              <a:rPr lang="en-US" dirty="0"/>
+              <a:t>We looked at the average attendance per game for all 30 MLB teams for the 2006-2016 seasons and compared it to the payroll of those teams for each year.</a:t>
+            </a:r>
+          </a:p>
+        </p:txBody>
+      </p:sp>
+    </p:spTree>
+    <p:extLst>
+      <p:ext uri="{BB962C8B-B14F-4D97-AF65-F5344CB8AC3E}">
+        <p14:creationId xmlns:p14="http://schemas.microsoft.com/office/powerpoint/2010/main" val="3580677403"/>
+      </p:ext>
+    </p:extLst>
+  </p:cSld>
+  <p:clrMapOvr>
+    <a:masterClrMapping/>
+  </p:clrMapOvr>
+</p:sld>
+</file>
+
+<file path=ppt/slides/slide18.xml><?xml version="1.0" encoding="utf-8"?>
+<p:sld xmlns:a="http://schemas.openxmlformats.org/drawingml/2006/main" xmlns:r="http://schemas.openxmlformats.org/officeDocument/2006/relationships" xmlns:p="http://schemas.openxmlformats.org/presentationml/2006/main">
+  <p:cSld>
+    <p:spTree>
+      <p:nvGrpSpPr>
+        <p:cNvPr id="1" name=""/>
+        <p:cNvGrpSpPr/>
+        <p:nvPr/>
+      </p:nvGrpSpPr>
+      <p:grpSpPr>
+        <a:xfrm>
+          <a:off x="0" y="0"/>
+          <a:ext cx="0" cy="0"/>
+          <a:chOff x="0" y="0"/>
+          <a:chExt cx="0" cy="0"/>
+        </a:xfrm>
+      </p:grpSpPr>
+      <p:pic>
+        <p:nvPicPr>
+          <p:cNvPr id="7" name="Picture 6" descr="A screenshot of a cell phone&#10;&#10;Description automatically generated">
+            <a:extLst>
+              <a:ext uri="{FF2B5EF4-FFF2-40B4-BE49-F238E27FC236}">
+                <a16:creationId xmlns:a16="http://schemas.microsoft.com/office/drawing/2014/main" id="{8EF081D9-66CF-4EEC-B66C-8FEE940C4162}"/>
+              </a:ext>
+            </a:extLst>
+          </p:cNvPr>
+          <p:cNvPicPr>
+            <a:picLocks noChangeAspect="1"/>
+          </p:cNvPicPr>
+          <p:nvPr/>
+        </p:nvPicPr>
+        <p:blipFill>
+          <a:blip r:embed="rId2">
+            <a:extLst>
+              <a:ext uri="{28A0092B-C50C-407E-A947-70E740481C1C}">
+                <a14:useLocalDpi xmlns:a14="http://schemas.microsoft.com/office/drawing/2010/main" val="0"/>
+              </a:ext>
+            </a:extLst>
+          </a:blip>
+          <a:stretch>
+            <a:fillRect/>
+          </a:stretch>
+        </p:blipFill>
+        <p:spPr>
+          <a:xfrm>
+            <a:off x="1603806" y="757647"/>
+            <a:ext cx="8984388" cy="5435780"/>
+          </a:xfrm>
+          <a:prstGeom prst="rect">
+            <a:avLst/>
+          </a:prstGeom>
+        </p:spPr>
+      </p:pic>
+    </p:spTree>
+    <p:extLst>
+      <p:ext uri="{BB962C8B-B14F-4D97-AF65-F5344CB8AC3E}">
+        <p14:creationId xmlns:p14="http://schemas.microsoft.com/office/powerpoint/2010/main" val="3819617400"/>
+      </p:ext>
+    </p:extLst>
+  </p:cSld>
+  <p:clrMapOvr>
+    <a:masterClrMapping/>
+  </p:clrMapOvr>
+</p:sld>
+</file>
+
+<file path=ppt/slides/slide19.xml><?xml version="1.0" encoding="utf-8"?>
+<p:sld xmlns:a="http://schemas.openxmlformats.org/drawingml/2006/main" xmlns:r="http://schemas.openxmlformats.org/officeDocument/2006/relationships" xmlns:p="http://schemas.openxmlformats.org/presentationml/2006/main">
+  <p:cSld>
+    <p:spTree>
+      <p:nvGrpSpPr>
+        <p:cNvPr id="1" name=""/>
+        <p:cNvGrpSpPr/>
+        <p:nvPr/>
+      </p:nvGrpSpPr>
+      <p:grpSpPr>
+        <a:xfrm>
+          <a:off x="0" y="0"/>
+          <a:ext cx="0" cy="0"/>
+          <a:chOff x="0" y="0"/>
+          <a:chExt cx="0" cy="0"/>
+        </a:xfrm>
+      </p:grpSpPr>
+      <p:sp>
+        <p:nvSpPr>
+          <p:cNvPr id="2" name="Title 1">
+            <a:extLst>
+              <a:ext uri="{FF2B5EF4-FFF2-40B4-BE49-F238E27FC236}">
+                <a16:creationId xmlns:a16="http://schemas.microsoft.com/office/drawing/2014/main" id="{7AFCE98D-A7FA-4804-840D-461299883694}"/>
+              </a:ext>
+            </a:extLst>
+          </p:cNvPr>
+          <p:cNvSpPr>
+            <a:spLocks noGrp="1"/>
+          </p:cNvSpPr>
+          <p:nvPr>
+            <p:ph type="title"/>
+          </p:nvPr>
+        </p:nvSpPr>
+        <p:spPr/>
+        <p:txBody>
+          <a:bodyPr>
+            <a:normAutofit/>
+          </a:bodyPr>
+          <a:lstStyle/>
+          <a:p>
+            <a:r>
+              <a:rPr lang="en-US" dirty="0"/>
+              <a:t>Conclusions</a:t>
+            </a:r>
+          </a:p>
+        </p:txBody>
+      </p:sp>
+      <p:sp>
+        <p:nvSpPr>
+          <p:cNvPr id="3" name="Content Placeholder 2">
+            <a:extLst>
+              <a:ext uri="{FF2B5EF4-FFF2-40B4-BE49-F238E27FC236}">
+                <a16:creationId xmlns:a16="http://schemas.microsoft.com/office/drawing/2014/main" id="{CFB58759-17B5-4A3D-91BB-81EFBC216915}"/>
+              </a:ext>
+            </a:extLst>
+          </p:cNvPr>
+          <p:cNvSpPr>
+            <a:spLocks noGrp="1"/>
+          </p:cNvSpPr>
+          <p:nvPr>
+            <p:ph idx="1"/>
+          </p:nvPr>
+        </p:nvSpPr>
+        <p:spPr/>
+        <p:txBody>
+          <a:bodyPr/>
+          <a:lstStyle/>
+          <a:p>
+            <a:r>
+              <a:rPr lang="en-US" dirty="0"/>
+              <a:t>There is a strong (.83) correlation between team payroll and ticket sales.</a:t>
+            </a:r>
+          </a:p>
+          <a:p>
+            <a:r>
+              <a:rPr lang="en-US" dirty="0"/>
+              <a:t>This is probably telling us that teams which sell many tickets have more funds available to spend on payroll.</a:t>
+            </a:r>
+          </a:p>
+          <a:p>
+            <a:r>
+              <a:rPr lang="en-US" dirty="0"/>
+              <a:t>There are however some outliers.  For example, the Yankees spent 2.14x what the average team spent during this period compared to 1.09x the average for the Cardinals but the Cardinals sold 92% of the tickets that the Yankees sold during this period. </a:t>
+            </a:r>
+          </a:p>
+        </p:txBody>
+      </p:sp>
+    </p:spTree>
+    <p:extLst>
+      <p:ext uri="{BB962C8B-B14F-4D97-AF65-F5344CB8AC3E}">
+        <p14:creationId xmlns:p14="http://schemas.microsoft.com/office/powerpoint/2010/main" val="1435624588"/>
+      </p:ext>
+    </p:extLst>
+  </p:cSld>
+  <p:clrMapOvr>
+    <a:masterClrMapping/>
+  </p:clrMapOvr>
+</p:sld>
+</file>
+
+<file path=ppt/slides/slide2.xml><?xml version="1.0" encoding="utf-8"?>
+<p:sld xmlns:a="http://schemas.openxmlformats.org/drawingml/2006/main" xmlns:r="http://schemas.openxmlformats.org/officeDocument/2006/relationships" xmlns:p="http://schemas.openxmlformats.org/presentationml/2006/main">
+  <p:cSld>
+    <p:spTree>
+      <p:nvGrpSpPr>
+        <p:cNvPr id="1" name=""/>
+        <p:cNvGrpSpPr/>
+        <p:nvPr/>
+      </p:nvGrpSpPr>
+      <p:grpSpPr>
+        <a:xfrm>
+          <a:off x="0" y="0"/>
+          <a:ext cx="0" cy="0"/>
+          <a:chOff x="0" y="0"/>
+          <a:chExt cx="0" cy="0"/>
+        </a:xfrm>
+      </p:grpSpPr>
+      <p:sp>
+        <p:nvSpPr>
+          <p:cNvPr id="2" name="Title 1">
+            <a:extLst>
+              <a:ext uri="{FF2B5EF4-FFF2-40B4-BE49-F238E27FC236}">
+                <a16:creationId xmlns:a16="http://schemas.microsoft.com/office/drawing/2014/main" id="{24DD1665-CBAA-49EF-B2F8-FC9038D68E52}"/>
+              </a:ext>
+            </a:extLst>
+          </p:cNvPr>
+          <p:cNvSpPr>
+            <a:spLocks noGrp="1"/>
+          </p:cNvSpPr>
+          <p:nvPr>
+            <p:ph type="title"/>
+          </p:nvPr>
+        </p:nvSpPr>
+        <p:spPr/>
+        <p:txBody>
+          <a:bodyPr/>
+          <a:lstStyle/>
+          <a:p>
+            <a:r>
+              <a:rPr lang="en-US" dirty="0"/>
+              <a:t>What we are analyzing…</a:t>
+            </a:r>
+          </a:p>
+        </p:txBody>
+      </p:sp>
+      <p:sp>
+        <p:nvSpPr>
+          <p:cNvPr id="3" name="Content Placeholder 2">
+            <a:extLst>
+              <a:ext uri="{FF2B5EF4-FFF2-40B4-BE49-F238E27FC236}">
+                <a16:creationId xmlns:a16="http://schemas.microsoft.com/office/drawing/2014/main" id="{1B16A0FC-FC9F-4D42-8DD6-85831D64359D}"/>
+              </a:ext>
+            </a:extLst>
+          </p:cNvPr>
+          <p:cNvSpPr>
+            <a:spLocks noGrp="1"/>
+          </p:cNvSpPr>
+          <p:nvPr>
+            <p:ph idx="1"/>
+          </p:nvPr>
+        </p:nvSpPr>
+        <p:spPr/>
+        <p:txBody>
+          <a:bodyPr/>
+          <a:lstStyle/>
+          <a:p>
+            <a:pPr marL="457200" indent="-457200">
+              <a:buFont typeface="+mj-lt"/>
+              <a:buAutoNum type="arabicPeriod"/>
+            </a:pPr>
+            <a:r>
+              <a:rPr lang="en-US" dirty="0"/>
+              <a:t>Attendance vs. Record</a:t>
+            </a:r>
+          </a:p>
+          <a:p>
+            <a:pPr marL="457200" indent="-457200">
+              <a:buFont typeface="+mj-lt"/>
+              <a:buAutoNum type="arabicPeriod"/>
+            </a:pPr>
+            <a:r>
+              <a:rPr lang="en-US" dirty="0"/>
+              <a:t>Attendance vs. Salary</a:t>
+            </a:r>
+          </a:p>
+          <a:p>
+            <a:pPr marL="457200" indent="-457200">
+              <a:buFont typeface="+mj-lt"/>
+              <a:buAutoNum type="arabicPeriod"/>
+            </a:pPr>
+            <a:r>
+              <a:rPr lang="en-US" dirty="0"/>
+              <a:t>Attendance vs. Weather</a:t>
+            </a:r>
+          </a:p>
+          <a:p>
+            <a:pPr marL="457200" indent="-457200">
+              <a:buFont typeface="+mj-lt"/>
+              <a:buAutoNum type="arabicPeriod"/>
+            </a:pPr>
+            <a:r>
+              <a:rPr lang="en-US" dirty="0"/>
+              <a:t>Attendance vs. Population</a:t>
+            </a:r>
+          </a:p>
+          <a:p>
+            <a:endParaRPr lang="en-US" dirty="0"/>
+          </a:p>
+        </p:txBody>
+      </p:sp>
+    </p:spTree>
+    <p:extLst>
+      <p:ext uri="{BB962C8B-B14F-4D97-AF65-F5344CB8AC3E}">
+        <p14:creationId xmlns:p14="http://schemas.microsoft.com/office/powerpoint/2010/main" val="4104559821"/>
+      </p:ext>
+    </p:extLst>
+  </p:cSld>
+  <p:clrMapOvr>
+    <a:masterClrMapping/>
+  </p:clrMapOvr>
+</p:sld>
+</file>
+
+<file path=ppt/slides/slide20.xml><?xml version="1.0" encoding="utf-8"?>
+<p:sld xmlns:a="http://schemas.openxmlformats.org/drawingml/2006/main" xmlns:r="http://schemas.openxmlformats.org/officeDocument/2006/relationships" xmlns:p="http://schemas.openxmlformats.org/presentationml/2006/main">
+  <p:cSld>
+    <p:spTree>
+      <p:nvGrpSpPr>
+        <p:cNvPr id="1" name=""/>
+        <p:cNvGrpSpPr/>
+        <p:nvPr/>
+      </p:nvGrpSpPr>
+      <p:grpSpPr>
+        <a:xfrm>
+          <a:off x="0" y="0"/>
+          <a:ext cx="0" cy="0"/>
+          <a:chOff x="0" y="0"/>
+          <a:chExt cx="0" cy="0"/>
+        </a:xfrm>
+      </p:grpSpPr>
+      <p:sp>
+        <p:nvSpPr>
           <p:cNvPr id="2" name="Title 1"/>
           <p:cNvSpPr>
             <a:spLocks noGrp="1"/>
@@ -7652,7 +8118,7 @@
 </p:sld>
 </file>
 
-<file path=ppt/slides/slide17.xml><?xml version="1.0" encoding="utf-8"?>
+<file path=ppt/slides/slide21.xml><?xml version="1.0" encoding="utf-8"?>
 <p:sld xmlns:a="http://schemas.openxmlformats.org/drawingml/2006/main" xmlns:r="http://schemas.openxmlformats.org/officeDocument/2006/relationships" xmlns:p="http://schemas.openxmlformats.org/presentationml/2006/main">
   <p:cSld>
     <p:spTree>
@@ -7970,7 +8436,7 @@
 </p:sld>
 </file>
 
-<file path=ppt/slides/slide18.xml><?xml version="1.0" encoding="utf-8"?>
+<file path=ppt/slides/slide22.xml><?xml version="1.0" encoding="utf-8"?>
 <p:sld xmlns:a="http://schemas.openxmlformats.org/drawingml/2006/main" xmlns:r="http://schemas.openxmlformats.org/officeDocument/2006/relationships" xmlns:p="http://schemas.openxmlformats.org/presentationml/2006/main">
   <p:cSld>
     <p:spTree>
@@ -8103,7 +8569,7 @@
 </p:sld>
 </file>
 
-<file path=ppt/slides/slide19.xml><?xml version="1.0" encoding="utf-8"?>
+<file path=ppt/slides/slide23.xml><?xml version="1.0" encoding="utf-8"?>
 <p:sld xmlns:a="http://schemas.openxmlformats.org/drawingml/2006/main" xmlns:r="http://schemas.openxmlformats.org/officeDocument/2006/relationships" xmlns:p="http://schemas.openxmlformats.org/presentationml/2006/main">
   <p:cSld>
     <p:spTree>
@@ -8197,7 +8663,7 @@
 </p:sld>
 </file>
 
-<file path=ppt/slides/slide2.xml><?xml version="1.0" encoding="utf-8"?>
+<file path=ppt/slides/slide24.xml><?xml version="1.0" encoding="utf-8"?>
 <p:sld xmlns:a="http://schemas.openxmlformats.org/drawingml/2006/main" xmlns:r="http://schemas.openxmlformats.org/officeDocument/2006/relationships" xmlns:p="http://schemas.openxmlformats.org/presentationml/2006/main">
   <p:cSld>
     <p:spTree>
@@ -8219,7 +8685,7 @@
           <p:cNvPr id="2" name="Title 1">
             <a:extLst>
               <a:ext uri="{FF2B5EF4-FFF2-40B4-BE49-F238E27FC236}">
-                <a16:creationId xmlns:a16="http://schemas.microsoft.com/office/drawing/2014/main" id="{24DD1665-CBAA-49EF-B2F8-FC9038D68E52}"/>
+                <a16:creationId xmlns:a16="http://schemas.microsoft.com/office/drawing/2014/main" id="{C8699DB7-1873-482D-8C00-87746D15FD0D}"/>
               </a:ext>
             </a:extLst>
           </p:cNvPr>
@@ -8237,7 +8703,7 @@
           <a:p>
             <a:r>
               <a:rPr lang="en-US" dirty="0"/>
-              <a:t>What we are analyzing…</a:t>
+              <a:t>Attendance per Game vs CSA Population</a:t>
             </a:r>
           </a:p>
         </p:txBody>
@@ -8247,7 +8713,7 @@
           <p:cNvPr id="3" name="Content Placeholder 2">
             <a:extLst>
               <a:ext uri="{FF2B5EF4-FFF2-40B4-BE49-F238E27FC236}">
-                <a16:creationId xmlns:a16="http://schemas.microsoft.com/office/drawing/2014/main" id="{1B16A0FC-FC9F-4D42-8DD6-85831D64359D}"/>
+                <a16:creationId xmlns:a16="http://schemas.microsoft.com/office/drawing/2014/main" id="{0AAB7EE4-A68E-4524-95CA-AC419981A2DA}"/>
               </a:ext>
             </a:extLst>
           </p:cNvPr>
@@ -8263,43 +8729,9 @@
           <a:bodyPr/>
           <a:lstStyle/>
           <a:p>
-            <a:pPr marL="457200" indent="-457200">
-              <a:buFont typeface="+mj-lt"/>
-              <a:buAutoNum type="arabicPeriod"/>
-            </a:pPr>
             <a:r>
               <a:rPr lang="en-US" dirty="0"/>
-              <a:t>Attendance vs. Record</a:t>
-            </a:r>
-          </a:p>
-          <a:p>
-            <a:pPr marL="457200" indent="-457200">
-              <a:buFont typeface="+mj-lt"/>
-              <a:buAutoNum type="arabicPeriod"/>
-            </a:pPr>
-            <a:r>
-              <a:rPr lang="en-US" dirty="0"/>
-              <a:t>Attendance vs. Salary</a:t>
-            </a:r>
-          </a:p>
-          <a:p>
-            <a:pPr marL="457200" indent="-457200">
-              <a:buFont typeface="+mj-lt"/>
-              <a:buAutoNum type="arabicPeriod"/>
-            </a:pPr>
-            <a:r>
-              <a:rPr lang="en-US" dirty="0"/>
-              <a:t>Attendance vs. Weather</a:t>
-            </a:r>
-          </a:p>
-          <a:p>
-            <a:pPr marL="457200" indent="-457200">
-              <a:buFont typeface="+mj-lt"/>
-              <a:buAutoNum type="arabicPeriod"/>
-            </a:pPr>
-            <a:r>
-              <a:rPr lang="en-US" dirty="0"/>
-              <a:t>Attendance vs. Population</a:t>
+              <a:t>How strong is the correlation between population and attendance per game?</a:t>
             </a:r>
           </a:p>
           <a:p>
@@ -8310,7 +8742,7 @@
     </p:spTree>
     <p:extLst>
       <p:ext uri="{BB962C8B-B14F-4D97-AF65-F5344CB8AC3E}">
-        <p14:creationId xmlns:p14="http://schemas.microsoft.com/office/powerpoint/2010/main" val="4104559821"/>
+        <p14:creationId xmlns:p14="http://schemas.microsoft.com/office/powerpoint/2010/main" val="2791275690"/>
       </p:ext>
     </p:extLst>
   </p:cSld>
@@ -8320,7 +8752,7 @@
 </p:sld>
 </file>
 
-<file path=ppt/slides/slide20.xml><?xml version="1.0" encoding="utf-8"?>
+<file path=ppt/slides/slide25.xml><?xml version="1.0" encoding="utf-8"?>
 <p:sld xmlns:a="http://schemas.openxmlformats.org/drawingml/2006/main" xmlns:r="http://schemas.openxmlformats.org/officeDocument/2006/relationships" xmlns:p="http://schemas.openxmlformats.org/presentationml/2006/main">
   <p:cSld>
     <p:spTree>
@@ -8339,95 +8771,6 @@
       </p:grpSpPr>
       <p:sp>
         <p:nvSpPr>
-          <p:cNvPr id="2" name="Title 1">
-            <a:extLst>
-              <a:ext uri="{FF2B5EF4-FFF2-40B4-BE49-F238E27FC236}">
-                <a16:creationId xmlns:a16="http://schemas.microsoft.com/office/drawing/2014/main" id="{C8699DB7-1873-482D-8C00-87746D15FD0D}"/>
-              </a:ext>
-            </a:extLst>
-          </p:cNvPr>
-          <p:cNvSpPr>
-            <a:spLocks noGrp="1"/>
-          </p:cNvSpPr>
-          <p:nvPr>
-            <p:ph type="title"/>
-          </p:nvPr>
-        </p:nvSpPr>
-        <p:spPr/>
-        <p:txBody>
-          <a:bodyPr/>
-          <a:lstStyle/>
-          <a:p>
-            <a:r>
-              <a:rPr lang="en-US" dirty="0"/>
-              <a:t>Attendance per Game vs CSA Population</a:t>
-            </a:r>
-          </a:p>
-        </p:txBody>
-      </p:sp>
-      <p:sp>
-        <p:nvSpPr>
-          <p:cNvPr id="3" name="Content Placeholder 2">
-            <a:extLst>
-              <a:ext uri="{FF2B5EF4-FFF2-40B4-BE49-F238E27FC236}">
-                <a16:creationId xmlns:a16="http://schemas.microsoft.com/office/drawing/2014/main" id="{0AAB7EE4-A68E-4524-95CA-AC419981A2DA}"/>
-              </a:ext>
-            </a:extLst>
-          </p:cNvPr>
-          <p:cNvSpPr>
-            <a:spLocks noGrp="1"/>
-          </p:cNvSpPr>
-          <p:nvPr>
-            <p:ph idx="1"/>
-          </p:nvPr>
-        </p:nvSpPr>
-        <p:spPr/>
-        <p:txBody>
-          <a:bodyPr/>
-          <a:lstStyle/>
-          <a:p>
-            <a:r>
-              <a:rPr lang="en-US" dirty="0"/>
-              <a:t>Is there a strong correlation between population and attendance per game?</a:t>
-            </a:r>
-          </a:p>
-          <a:p>
-            <a:endParaRPr lang="en-US" dirty="0"/>
-          </a:p>
-        </p:txBody>
-      </p:sp>
-    </p:spTree>
-    <p:extLst>
-      <p:ext uri="{BB962C8B-B14F-4D97-AF65-F5344CB8AC3E}">
-        <p14:creationId xmlns:p14="http://schemas.microsoft.com/office/powerpoint/2010/main" val="2791275690"/>
-      </p:ext>
-    </p:extLst>
-  </p:cSld>
-  <p:clrMapOvr>
-    <a:masterClrMapping/>
-  </p:clrMapOvr>
-</p:sld>
-</file>
-
-<file path=ppt/slides/slide21.xml><?xml version="1.0" encoding="utf-8"?>
-<p:sld xmlns:a="http://schemas.openxmlformats.org/drawingml/2006/main" xmlns:r="http://schemas.openxmlformats.org/officeDocument/2006/relationships" xmlns:p="http://schemas.openxmlformats.org/presentationml/2006/main">
-  <p:cSld>
-    <p:spTree>
-      <p:nvGrpSpPr>
-        <p:cNvPr id="1" name=""/>
-        <p:cNvGrpSpPr/>
-        <p:nvPr/>
-      </p:nvGrpSpPr>
-      <p:grpSpPr>
-        <a:xfrm>
-          <a:off x="0" y="0"/>
-          <a:ext cx="0" cy="0"/>
-          <a:chOff x="0" y="0"/>
-          <a:chExt cx="0" cy="0"/>
-        </a:xfrm>
-      </p:grpSpPr>
-      <p:sp>
-        <p:nvSpPr>
           <p:cNvPr id="5" name="Title 4">
             <a:extLst>
               <a:ext uri="{FF2B5EF4-FFF2-40B4-BE49-F238E27FC236}">
@@ -8501,7 +8844,7 @@
 </p:sld>
 </file>
 
-<file path=ppt/slides/slide22.xml><?xml version="1.0" encoding="utf-8"?>
+<file path=ppt/slides/slide26.xml><?xml version="1.0" encoding="utf-8"?>
 <p:sld xmlns:a="http://schemas.openxmlformats.org/drawingml/2006/main" xmlns:r="http://schemas.openxmlformats.org/officeDocument/2006/relationships" xmlns:p="http://schemas.openxmlformats.org/presentationml/2006/main">
   <p:cSld>
     <p:spTree>
@@ -8669,7 +9012,7 @@
 </p:sld>
 </file>
 
-<file path=ppt/slides/slide23.xml><?xml version="1.0" encoding="utf-8"?>
+<file path=ppt/slides/slide27.xml><?xml version="1.0" encoding="utf-8"?>
 <p:sld xmlns:a="http://schemas.openxmlformats.org/drawingml/2006/main" xmlns:r="http://schemas.openxmlformats.org/officeDocument/2006/relationships" xmlns:p="http://schemas.openxmlformats.org/presentationml/2006/main">
   <p:cSld>
     <p:spTree>
@@ -8735,7 +9078,7 @@
 </p:sld>
 </file>
 
-<file path=ppt/slides/slide24.xml><?xml version="1.0" encoding="utf-8"?>
+<file path=ppt/slides/slide28.xml><?xml version="1.0" encoding="utf-8"?>
 <p:sld xmlns:a="http://schemas.openxmlformats.org/drawingml/2006/main" xmlns:r="http://schemas.openxmlformats.org/officeDocument/2006/relationships" xmlns:p="http://schemas.openxmlformats.org/presentationml/2006/main">
   <p:cSld>
     <p:spTree>
@@ -8827,7 +9170,7 @@
 </p:sld>
 </file>
 
-<file path=ppt/slides/slide25.xml><?xml version="1.0" encoding="utf-8"?>
+<file path=ppt/slides/slide29.xml><?xml version="1.0" encoding="utf-8"?>
 <p:sld xmlns:a="http://schemas.openxmlformats.org/drawingml/2006/main" xmlns:r="http://schemas.openxmlformats.org/officeDocument/2006/relationships" xmlns:p="http://schemas.openxmlformats.org/presentationml/2006/main">
   <p:cSld>
     <p:spTree>
@@ -8909,7 +9252,7 @@
             </a:pPr>
             <a:r>
               <a:rPr lang="en-US" dirty="0"/>
-              <a:t>Team Salary: </a:t>
+              <a:t>Team Salary: .84</a:t>
             </a:r>
           </a:p>
           <a:p>
@@ -8941,195 +9284,6 @@
     <p:extLst>
       <p:ext uri="{BB962C8B-B14F-4D97-AF65-F5344CB8AC3E}">
         <p14:creationId xmlns:p14="http://schemas.microsoft.com/office/powerpoint/2010/main" val="2973225552"/>
-      </p:ext>
-    </p:extLst>
-  </p:cSld>
-  <p:clrMapOvr>
-    <a:masterClrMapping/>
-  </p:clrMapOvr>
-</p:sld>
-</file>
-
-<file path=ppt/slides/slide26.xml><?xml version="1.0" encoding="utf-8"?>
-<p:sld xmlns:a="http://schemas.openxmlformats.org/drawingml/2006/main" xmlns:r="http://schemas.openxmlformats.org/officeDocument/2006/relationships" xmlns:p="http://schemas.openxmlformats.org/presentationml/2006/main">
-  <p:cSld>
-    <p:spTree>
-      <p:nvGrpSpPr>
-        <p:cNvPr id="1" name=""/>
-        <p:cNvGrpSpPr/>
-        <p:nvPr/>
-      </p:nvGrpSpPr>
-      <p:grpSpPr>
-        <a:xfrm>
-          <a:off x="0" y="0"/>
-          <a:ext cx="0" cy="0"/>
-          <a:chOff x="0" y="0"/>
-          <a:chExt cx="0" cy="0"/>
-        </a:xfrm>
-      </p:grpSpPr>
-      <p:sp>
-        <p:nvSpPr>
-          <p:cNvPr id="2" name="Title 1">
-            <a:extLst>
-              <a:ext uri="{FF2B5EF4-FFF2-40B4-BE49-F238E27FC236}">
-                <a16:creationId xmlns:a16="http://schemas.microsoft.com/office/drawing/2014/main" id="{7482A9FF-77BF-43B0-B56D-CE296879E54B}"/>
-              </a:ext>
-            </a:extLst>
-          </p:cNvPr>
-          <p:cNvSpPr>
-            <a:spLocks noGrp="1"/>
-          </p:cNvSpPr>
-          <p:nvPr>
-            <p:ph type="title"/>
-          </p:nvPr>
-        </p:nvSpPr>
-        <p:spPr/>
-        <p:txBody>
-          <a:bodyPr/>
-          <a:lstStyle/>
-          <a:p>
-            <a:r>
-              <a:rPr lang="en-US" dirty="0"/>
-              <a:t>Conclusions</a:t>
-            </a:r>
-          </a:p>
-        </p:txBody>
-      </p:sp>
-      <p:sp>
-        <p:nvSpPr>
-          <p:cNvPr id="3" name="Content Placeholder 2">
-            <a:extLst>
-              <a:ext uri="{FF2B5EF4-FFF2-40B4-BE49-F238E27FC236}">
-                <a16:creationId xmlns:a16="http://schemas.microsoft.com/office/drawing/2014/main" id="{CF11FDA4-2CBA-435C-A4B8-10DF2D3E9734}"/>
-              </a:ext>
-            </a:extLst>
-          </p:cNvPr>
-          <p:cNvSpPr>
-            <a:spLocks noGrp="1"/>
-          </p:cNvSpPr>
-          <p:nvPr>
-            <p:ph idx="1"/>
-          </p:nvPr>
-        </p:nvSpPr>
-        <p:spPr/>
-        <p:txBody>
-          <a:bodyPr>
-            <a:normAutofit lnSpcReduction="10000"/>
-          </a:bodyPr>
-          <a:lstStyle/>
-          <a:p>
-            <a:r>
-              <a:rPr lang="en-US" dirty="0"/>
-              <a:t>We originally intended to look at some other factors such as concession prices but apparently this data is valuable enough that we would have had to pay for it.</a:t>
-            </a:r>
-          </a:p>
-          <a:p>
-            <a:r>
-              <a:rPr lang="en-US" dirty="0"/>
-              <a:t>Some of our results were surprising to us.  For instance, we assumed that weather would have a substantial effect and it apparently does not.</a:t>
-            </a:r>
-          </a:p>
-          <a:p>
-            <a:r>
-              <a:rPr lang="en-US" dirty="0"/>
-              <a:t>CSA population for the teams we looked at has a moderate correlation to ticket sales but this obviously doesn’t tell the whole story as teams in the same CSA show significant differences.</a:t>
-            </a:r>
-          </a:p>
-          <a:p>
-            <a:pPr marL="0" indent="0">
-              <a:buNone/>
-            </a:pPr>
-            <a:endParaRPr lang="en-US" dirty="0"/>
-          </a:p>
-        </p:txBody>
-      </p:sp>
-    </p:spTree>
-    <p:extLst>
-      <p:ext uri="{BB962C8B-B14F-4D97-AF65-F5344CB8AC3E}">
-        <p14:creationId xmlns:p14="http://schemas.microsoft.com/office/powerpoint/2010/main" val="2551738656"/>
-      </p:ext>
-    </p:extLst>
-  </p:cSld>
-  <p:clrMapOvr>
-    <a:masterClrMapping/>
-  </p:clrMapOvr>
-</p:sld>
-</file>
-
-<file path=ppt/slides/slide27.xml><?xml version="1.0" encoding="utf-8"?>
-<p:sld xmlns:a="http://schemas.openxmlformats.org/drawingml/2006/main" xmlns:r="http://schemas.openxmlformats.org/officeDocument/2006/relationships" xmlns:p="http://schemas.openxmlformats.org/presentationml/2006/main">
-  <p:cSld>
-    <p:spTree>
-      <p:nvGrpSpPr>
-        <p:cNvPr id="1" name=""/>
-        <p:cNvGrpSpPr/>
-        <p:nvPr/>
-      </p:nvGrpSpPr>
-      <p:grpSpPr>
-        <a:xfrm>
-          <a:off x="0" y="0"/>
-          <a:ext cx="0" cy="0"/>
-          <a:chOff x="0" y="0"/>
-          <a:chExt cx="0" cy="0"/>
-        </a:xfrm>
-      </p:grpSpPr>
-      <p:sp>
-        <p:nvSpPr>
-          <p:cNvPr id="2" name="Title 1">
-            <a:extLst>
-              <a:ext uri="{FF2B5EF4-FFF2-40B4-BE49-F238E27FC236}">
-                <a16:creationId xmlns:a16="http://schemas.microsoft.com/office/drawing/2014/main" id="{042B8ECD-AEE0-4CF2-909C-807F646C0350}"/>
-              </a:ext>
-            </a:extLst>
-          </p:cNvPr>
-          <p:cNvSpPr>
-            <a:spLocks noGrp="1"/>
-          </p:cNvSpPr>
-          <p:nvPr>
-            <p:ph type="title"/>
-          </p:nvPr>
-        </p:nvSpPr>
-        <p:spPr/>
-        <p:txBody>
-          <a:bodyPr/>
-          <a:lstStyle/>
-          <a:p>
-            <a:r>
-              <a:rPr lang="en-US" dirty="0"/>
-              <a:t>Questions?</a:t>
-            </a:r>
-          </a:p>
-        </p:txBody>
-      </p:sp>
-      <p:sp>
-        <p:nvSpPr>
-          <p:cNvPr id="3" name="Content Placeholder 2">
-            <a:extLst>
-              <a:ext uri="{FF2B5EF4-FFF2-40B4-BE49-F238E27FC236}">
-                <a16:creationId xmlns:a16="http://schemas.microsoft.com/office/drawing/2014/main" id="{CD21421E-377E-4D4F-9561-B8808BA29CDB}"/>
-              </a:ext>
-            </a:extLst>
-          </p:cNvPr>
-          <p:cNvSpPr>
-            <a:spLocks noGrp="1"/>
-          </p:cNvSpPr>
-          <p:nvPr>
-            <p:ph idx="1"/>
-          </p:nvPr>
-        </p:nvSpPr>
-        <p:spPr/>
-        <p:txBody>
-          <a:bodyPr/>
-          <a:lstStyle/>
-          <a:p>
-            <a:endParaRPr lang="en-US"/>
-          </a:p>
-        </p:txBody>
-      </p:sp>
-    </p:spTree>
-    <p:extLst>
-      <p:ext uri="{BB962C8B-B14F-4D97-AF65-F5344CB8AC3E}">
-        <p14:creationId xmlns:p14="http://schemas.microsoft.com/office/powerpoint/2010/main" val="1139941693"/>
       </p:ext>
     </p:extLst>
   </p:cSld>
@@ -9244,6 +9398,325 @@
     <p:extLst>
       <p:ext uri="{BB962C8B-B14F-4D97-AF65-F5344CB8AC3E}">
         <p14:creationId xmlns:p14="http://schemas.microsoft.com/office/powerpoint/2010/main" val="1751033339"/>
+      </p:ext>
+    </p:extLst>
+  </p:cSld>
+  <p:clrMapOvr>
+    <a:masterClrMapping/>
+  </p:clrMapOvr>
+</p:sld>
+</file>
+
+<file path=ppt/slides/slide30.xml><?xml version="1.0" encoding="utf-8"?>
+<p:sld xmlns:a="http://schemas.openxmlformats.org/drawingml/2006/main" xmlns:r="http://schemas.openxmlformats.org/officeDocument/2006/relationships" xmlns:p="http://schemas.openxmlformats.org/presentationml/2006/main">
+  <p:cSld>
+    <p:spTree>
+      <p:nvGrpSpPr>
+        <p:cNvPr id="1" name=""/>
+        <p:cNvGrpSpPr/>
+        <p:nvPr/>
+      </p:nvGrpSpPr>
+      <p:grpSpPr>
+        <a:xfrm>
+          <a:off x="0" y="0"/>
+          <a:ext cx="0" cy="0"/>
+          <a:chOff x="0" y="0"/>
+          <a:chExt cx="0" cy="0"/>
+        </a:xfrm>
+      </p:grpSpPr>
+      <p:sp>
+        <p:nvSpPr>
+          <p:cNvPr id="2" name="Title 1">
+            <a:extLst>
+              <a:ext uri="{FF2B5EF4-FFF2-40B4-BE49-F238E27FC236}">
+                <a16:creationId xmlns:a16="http://schemas.microsoft.com/office/drawing/2014/main" id="{7482A9FF-77BF-43B0-B56D-CE296879E54B}"/>
+              </a:ext>
+            </a:extLst>
+          </p:cNvPr>
+          <p:cNvSpPr>
+            <a:spLocks noGrp="1"/>
+          </p:cNvSpPr>
+          <p:nvPr>
+            <p:ph type="title"/>
+          </p:nvPr>
+        </p:nvSpPr>
+        <p:spPr/>
+        <p:txBody>
+          <a:bodyPr/>
+          <a:lstStyle/>
+          <a:p>
+            <a:r>
+              <a:rPr lang="en-US" dirty="0"/>
+              <a:t>Conclusions</a:t>
+            </a:r>
+          </a:p>
+        </p:txBody>
+      </p:sp>
+      <p:sp>
+        <p:nvSpPr>
+          <p:cNvPr id="3" name="Content Placeholder 2">
+            <a:extLst>
+              <a:ext uri="{FF2B5EF4-FFF2-40B4-BE49-F238E27FC236}">
+                <a16:creationId xmlns:a16="http://schemas.microsoft.com/office/drawing/2014/main" id="{CF11FDA4-2CBA-435C-A4B8-10DF2D3E9734}"/>
+              </a:ext>
+            </a:extLst>
+          </p:cNvPr>
+          <p:cNvSpPr>
+            <a:spLocks noGrp="1"/>
+          </p:cNvSpPr>
+          <p:nvPr>
+            <p:ph idx="1"/>
+          </p:nvPr>
+        </p:nvSpPr>
+        <p:spPr/>
+        <p:txBody>
+          <a:bodyPr>
+            <a:normAutofit/>
+          </a:bodyPr>
+          <a:lstStyle/>
+          <a:p>
+            <a:r>
+              <a:rPr lang="en-US" dirty="0"/>
+              <a:t>We originally intended to look at some other factors such as concession prices but apparently this data is valuable enough that we would have had to pay for it.</a:t>
+            </a:r>
+          </a:p>
+          <a:p>
+            <a:r>
+              <a:rPr lang="en-US" dirty="0"/>
+              <a:t>Some of our results were surprising to us.  For instance, we assumed that weather would have a substantial effect and it apparently does not.</a:t>
+            </a:r>
+          </a:p>
+          <a:p>
+            <a:r>
+              <a:rPr lang="en-US" dirty="0"/>
+              <a:t>True attendance data is not made available by the MLB so while our sources called it “Attendance” we’ve really been discussing </a:t>
+            </a:r>
+            <a:r>
+              <a:rPr lang="en-US"/>
+              <a:t>ticket sales.</a:t>
+            </a:r>
+            <a:endParaRPr lang="en-US" dirty="0"/>
+          </a:p>
+        </p:txBody>
+      </p:sp>
+    </p:spTree>
+    <p:extLst>
+      <p:ext uri="{BB962C8B-B14F-4D97-AF65-F5344CB8AC3E}">
+        <p14:creationId xmlns:p14="http://schemas.microsoft.com/office/powerpoint/2010/main" val="2551738656"/>
+      </p:ext>
+    </p:extLst>
+  </p:cSld>
+  <p:clrMapOvr>
+    <a:masterClrMapping/>
+  </p:clrMapOvr>
+</p:sld>
+</file>
+
+<file path=ppt/slides/slide31.xml><?xml version="1.0" encoding="utf-8"?>
+<p:sld xmlns:a="http://schemas.openxmlformats.org/drawingml/2006/main" xmlns:r="http://schemas.openxmlformats.org/officeDocument/2006/relationships" xmlns:p="http://schemas.openxmlformats.org/presentationml/2006/main">
+  <p:cSld>
+    <p:spTree>
+      <p:nvGrpSpPr>
+        <p:cNvPr id="1" name=""/>
+        <p:cNvGrpSpPr/>
+        <p:nvPr/>
+      </p:nvGrpSpPr>
+      <p:grpSpPr>
+        <a:xfrm>
+          <a:off x="0" y="0"/>
+          <a:ext cx="0" cy="0"/>
+          <a:chOff x="0" y="0"/>
+          <a:chExt cx="0" cy="0"/>
+        </a:xfrm>
+      </p:grpSpPr>
+      <p:sp>
+        <p:nvSpPr>
+          <p:cNvPr id="2" name="Title 1">
+            <a:extLst>
+              <a:ext uri="{FF2B5EF4-FFF2-40B4-BE49-F238E27FC236}">
+                <a16:creationId xmlns:a16="http://schemas.microsoft.com/office/drawing/2014/main" id="{DF225C42-7DB4-410F-988C-5D4CE81D6A9A}"/>
+              </a:ext>
+            </a:extLst>
+          </p:cNvPr>
+          <p:cNvSpPr>
+            <a:spLocks noGrp="1"/>
+          </p:cNvSpPr>
+          <p:nvPr>
+            <p:ph type="title"/>
+          </p:nvPr>
+        </p:nvSpPr>
+        <p:spPr/>
+        <p:txBody>
+          <a:bodyPr/>
+          <a:lstStyle/>
+          <a:p>
+            <a:r>
+              <a:rPr lang="en-US" dirty="0"/>
+              <a:t>Sources</a:t>
+            </a:r>
+          </a:p>
+        </p:txBody>
+      </p:sp>
+      <p:sp>
+        <p:nvSpPr>
+          <p:cNvPr id="3" name="Content Placeholder 2">
+            <a:extLst>
+              <a:ext uri="{FF2B5EF4-FFF2-40B4-BE49-F238E27FC236}">
+                <a16:creationId xmlns:a16="http://schemas.microsoft.com/office/drawing/2014/main" id="{E2036D74-59EB-4740-9B1D-6239E59168D3}"/>
+              </a:ext>
+            </a:extLst>
+          </p:cNvPr>
+          <p:cNvSpPr>
+            <a:spLocks noGrp="1"/>
+          </p:cNvSpPr>
+          <p:nvPr>
+            <p:ph idx="1"/>
+          </p:nvPr>
+        </p:nvSpPr>
+        <p:spPr>
+          <a:xfrm>
+            <a:off x="1295401" y="2474752"/>
+            <a:ext cx="9601196" cy="3401116"/>
+          </a:xfrm>
+        </p:spPr>
+        <p:txBody>
+          <a:bodyPr/>
+          <a:lstStyle/>
+          <a:p>
+            <a:r>
+              <a:rPr lang="en-US" dirty="0">
+                <a:hlinkClick r:id="rId2"/>
+              </a:rPr>
+              <a:t>https://www.baseball-reference.com/leagues/MLB/2006-misc.shtml</a:t>
+            </a:r>
+            <a:endParaRPr lang="en-US" dirty="0"/>
+          </a:p>
+          <a:p>
+            <a:r>
+              <a:rPr lang="en-US" dirty="0"/>
+              <a:t> </a:t>
+            </a:r>
+            <a:r>
+              <a:rPr lang="en-US" dirty="0">
+                <a:hlinkClick r:id="rId3"/>
+              </a:rPr>
+              <a:t>https://www.kaggle.com/cyaris/2016-mlb-season</a:t>
+            </a:r>
+            <a:endParaRPr lang="en-US" dirty="0"/>
+          </a:p>
+          <a:p>
+            <a:r>
+              <a:rPr lang="en-US" dirty="0">
+                <a:hlinkClick r:id="rId4"/>
+              </a:rPr>
+              <a:t>https://www.kaggle.com/omipelcastre/mlb-team-statistics-20182003</a:t>
+            </a:r>
+            <a:endParaRPr lang="en-US" dirty="0"/>
+          </a:p>
+          <a:p>
+            <a:r>
+              <a:rPr lang="en-US" dirty="0"/>
+              <a:t>2010 US Census Summary File 1 via census wrapper API</a:t>
+            </a:r>
+          </a:p>
+          <a:p>
+            <a:r>
+              <a:rPr lang="en-US" dirty="0">
+                <a:hlinkClick r:id="rId5"/>
+              </a:rPr>
+              <a:t>https://www.kaggle.com/arashnic/baseballdatabank</a:t>
+            </a:r>
+            <a:endParaRPr lang="en-US" dirty="0"/>
+          </a:p>
+        </p:txBody>
+      </p:sp>
+    </p:spTree>
+    <p:extLst>
+      <p:ext uri="{BB962C8B-B14F-4D97-AF65-F5344CB8AC3E}">
+        <p14:creationId xmlns:p14="http://schemas.microsoft.com/office/powerpoint/2010/main" val="1063926720"/>
+      </p:ext>
+    </p:extLst>
+  </p:cSld>
+  <p:clrMapOvr>
+    <a:masterClrMapping/>
+  </p:clrMapOvr>
+</p:sld>
+</file>
+
+<file path=ppt/slides/slide32.xml><?xml version="1.0" encoding="utf-8"?>
+<p:sld xmlns:a="http://schemas.openxmlformats.org/drawingml/2006/main" xmlns:r="http://schemas.openxmlformats.org/officeDocument/2006/relationships" xmlns:p="http://schemas.openxmlformats.org/presentationml/2006/main">
+  <p:cSld>
+    <p:spTree>
+      <p:nvGrpSpPr>
+        <p:cNvPr id="1" name=""/>
+        <p:cNvGrpSpPr/>
+        <p:nvPr/>
+      </p:nvGrpSpPr>
+      <p:grpSpPr>
+        <a:xfrm>
+          <a:off x="0" y="0"/>
+          <a:ext cx="0" cy="0"/>
+          <a:chOff x="0" y="0"/>
+          <a:chExt cx="0" cy="0"/>
+        </a:xfrm>
+      </p:grpSpPr>
+      <p:sp>
+        <p:nvSpPr>
+          <p:cNvPr id="2" name="Title 1">
+            <a:extLst>
+              <a:ext uri="{FF2B5EF4-FFF2-40B4-BE49-F238E27FC236}">
+                <a16:creationId xmlns:a16="http://schemas.microsoft.com/office/drawing/2014/main" id="{042B8ECD-AEE0-4CF2-909C-807F646C0350}"/>
+              </a:ext>
+            </a:extLst>
+          </p:cNvPr>
+          <p:cNvSpPr>
+            <a:spLocks noGrp="1"/>
+          </p:cNvSpPr>
+          <p:nvPr>
+            <p:ph type="title"/>
+          </p:nvPr>
+        </p:nvSpPr>
+        <p:spPr/>
+        <p:txBody>
+          <a:bodyPr/>
+          <a:lstStyle/>
+          <a:p>
+            <a:r>
+              <a:rPr lang="en-US" dirty="0"/>
+              <a:t>Questions?</a:t>
+            </a:r>
+          </a:p>
+        </p:txBody>
+      </p:sp>
+      <p:sp>
+        <p:nvSpPr>
+          <p:cNvPr id="3" name="Content Placeholder 2">
+            <a:extLst>
+              <a:ext uri="{FF2B5EF4-FFF2-40B4-BE49-F238E27FC236}">
+                <a16:creationId xmlns:a16="http://schemas.microsoft.com/office/drawing/2014/main" id="{CD21421E-377E-4D4F-9561-B8808BA29CDB}"/>
+              </a:ext>
+            </a:extLst>
+          </p:cNvPr>
+          <p:cNvSpPr>
+            <a:spLocks noGrp="1"/>
+          </p:cNvSpPr>
+          <p:nvPr>
+            <p:ph idx="1"/>
+          </p:nvPr>
+        </p:nvSpPr>
+        <p:spPr/>
+        <p:txBody>
+          <a:bodyPr/>
+          <a:lstStyle/>
+          <a:p>
+            <a:endParaRPr lang="en-US"/>
+          </a:p>
+        </p:txBody>
+      </p:sp>
+    </p:spTree>
+    <p:extLst>
+      <p:ext uri="{BB962C8B-B14F-4D97-AF65-F5344CB8AC3E}">
+        <p14:creationId xmlns:p14="http://schemas.microsoft.com/office/powerpoint/2010/main" val="1139941693"/>
       </p:ext>
     </p:extLst>
   </p:cSld>

</xml_diff>

<commit_message>
resized an image in temperature data
</commit_message>
<xml_diff>
--- a/Slides/Red Team Presentation.pptx
+++ b/Slides/Red Team Presentation.pptx
@@ -8515,8 +8515,8 @@
         </p:blipFill>
         <p:spPr bwMode="auto">
           <a:xfrm>
-            <a:off x="1556197" y="457200"/>
-            <a:ext cx="8988425" cy="5943600"/>
+            <a:off x="1899067" y="742294"/>
+            <a:ext cx="8393865" cy="5550447"/>
           </a:xfrm>
           <a:prstGeom prst="rect">
             <a:avLst/>

</xml_diff>

<commit_message>
minor tweak to conclusion slides
</commit_message>
<xml_diff>
--- a/Slides/Red Team Presentation.pptx
+++ b/Slides/Red Team Presentation.pptx
@@ -9471,7 +9471,7 @@
         <p:spPr/>
         <p:txBody>
           <a:bodyPr>
-            <a:normAutofit/>
+            <a:normAutofit fontScale="92500"/>
           </a:bodyPr>
           <a:lstStyle/>
           <a:p>
@@ -9483,19 +9483,14 @@
           <a:p>
             <a:r>
               <a:rPr lang="en-US" dirty="0"/>
-              <a:t>Some of our results were surprising to us.  For instance, we assumed that weather would have a substantial effect and it apparently does not.</a:t>
+              <a:t>Some of our results were surprising to us.  For instance, we assumed that weather would have a substantial effect and it apparently does not.  St Louis does better than we had expected relative to the population size and spending on payroll.</a:t>
             </a:r>
           </a:p>
           <a:p>
             <a:r>
               <a:rPr lang="en-US" dirty="0"/>
-              <a:t>True attendance data is not made available by the MLB so while our sources called it “Attendance” we’ve really been discussing </a:t>
-            </a:r>
-            <a:r>
-              <a:rPr lang="en-US"/>
-              <a:t>ticket sales.</a:t>
-            </a:r>
-            <a:endParaRPr lang="en-US" dirty="0"/>
+              <a:t>True attendance data is not made available by the MLB so while our sources called it “Attendance” we’ve really been discussing ticket sales.</a:t>
+            </a:r>
           </a:p>
         </p:txBody>
       </p:sp>

</xml_diff>

<commit_message>
changed weather to temp in a few places, changed ticket sales to attendance in a few places
</commit_message>
<xml_diff>
--- a/Slides/Red Team Presentation.pptx
+++ b/Slides/Red Team Presentation.pptx
@@ -7646,7 +7646,7 @@
           <a:p>
             <a:r>
               <a:rPr lang="en-US" dirty="0"/>
-              <a:t>What is the correlation between team salaries and ticket sales?</a:t>
+              <a:t>What is the correlation between team salaries and attendance?</a:t>
             </a:r>
           </a:p>
         </p:txBody>
@@ -8008,7 +8008,7 @@
             </a:pPr>
             <a:r>
               <a:rPr lang="en-US" dirty="0"/>
-              <a:t>Attendance vs. Weather</a:t>
+              <a:t>Attendance vs. Temperature</a:t>
             </a:r>
           </a:p>
           <a:p>
@@ -8603,7 +8603,7 @@
           <a:p>
             <a:r>
               <a:rPr lang="en-US" dirty="0"/>
-              <a:t>Weather Conclusions</a:t>
+              <a:t>Temperature Conclusions</a:t>
             </a:r>
           </a:p>
         </p:txBody>

</xml_diff>